<commit_message>
line following and teleop
</commit_message>
<xml_diff>
--- a/Documentation/files/Models_Textures/textures/road1.pptx
+++ b/Documentation/files/Models_Textures/textures/road1.pptx
@@ -6,8 +6,9 @@
   </p:sldMasterIdLst>
   <p:sldIdLst>
     <p:sldId id="256" r:id="rId2"/>
-    <p:sldId id="257" r:id="rId3"/>
-    <p:sldId id="258" r:id="rId4"/>
+    <p:sldId id="259" r:id="rId3"/>
+    <p:sldId id="257" r:id="rId4"/>
+    <p:sldId id="258" r:id="rId5"/>
   </p:sldIdLst>
   <p:sldSz cx="12192000" cy="6858000"/>
   <p:notesSz cx="6858000" cy="9144000"/>
@@ -106,6 +107,11 @@
       </a:defRPr>
     </a:lvl9pPr>
   </p:defaultTextStyle>
+  <p:extLst>
+    <p:ext uri="{EFAFB233-063F-42B5-8137-9DF3F51BA10A}">
+      <p15:sldGuideLst xmlns:p15="http://schemas.microsoft.com/office/powerpoint/2012/main"/>
+    </p:ext>
+  </p:extLst>
 </p:presentation>
 </file>
 
@@ -781,6 +787,139 @@
 </file>
 
 <file path=ppt/slides/slide1.xml><?xml version="1.0" encoding="utf-8"?>
+<p:sld xmlns:a="http://schemas.openxmlformats.org/drawingml/2006/main" xmlns:r="http://schemas.openxmlformats.org/officeDocument/2006/relationships" xmlns:p="http://schemas.openxmlformats.org/presentationml/2006/main">
+  <p:cSld>
+    <p:spTree>
+      <p:nvGrpSpPr>
+        <p:cNvPr id="1" name=""/>
+        <p:cNvGrpSpPr/>
+        <p:nvPr/>
+      </p:nvGrpSpPr>
+      <p:grpSpPr>
+        <a:xfrm>
+          <a:off x="0" y="0"/>
+          <a:ext cx="0" cy="0"/>
+          <a:chOff x="0" y="0"/>
+          <a:chExt cx="0" cy="0"/>
+        </a:xfrm>
+      </p:grpSpPr>
+      <p:sp>
+        <p:nvSpPr>
+          <p:cNvPr id="4" name="Rectángulo 3">
+            <a:extLst>
+              <a:ext uri="{FF2B5EF4-FFF2-40B4-BE49-F238E27FC236}">
+                <a16:creationId xmlns:a16="http://schemas.microsoft.com/office/drawing/2014/main" id="{A6301555-F5B1-4164-897D-2596429B4614}"/>
+              </a:ext>
+            </a:extLst>
+          </p:cNvPr>
+          <p:cNvSpPr/>
+          <p:nvPr/>
+        </p:nvSpPr>
+        <p:spPr>
+          <a:xfrm>
+            <a:off x="986828" y="356843"/>
+            <a:ext cx="7143184" cy="5576934"/>
+          </a:xfrm>
+          <a:prstGeom prst="rect">
+            <a:avLst/>
+          </a:prstGeom>
+          <a:solidFill>
+            <a:schemeClr val="tx1"/>
+          </a:solidFill>
+        </p:spPr>
+        <p:style>
+          <a:lnRef idx="2">
+            <a:schemeClr val="accent1">
+              <a:shade val="50000"/>
+            </a:schemeClr>
+          </a:lnRef>
+          <a:fillRef idx="1">
+            <a:schemeClr val="accent1"/>
+          </a:fillRef>
+          <a:effectRef idx="0">
+            <a:schemeClr val="accent1"/>
+          </a:effectRef>
+          <a:fontRef idx="minor">
+            <a:schemeClr val="lt1"/>
+          </a:fontRef>
+        </p:style>
+        <p:txBody>
+          <a:bodyPr rtlCol="0" anchor="ctr"/>
+          <a:lstStyle/>
+          <a:p>
+            <a:pPr algn="ctr"/>
+            <a:endParaRPr lang="ca-ES"/>
+          </a:p>
+        </p:txBody>
+      </p:sp>
+      <p:sp>
+        <p:nvSpPr>
+          <p:cNvPr id="5" name="Elipse 4">
+            <a:extLst>
+              <a:ext uri="{FF2B5EF4-FFF2-40B4-BE49-F238E27FC236}">
+                <a16:creationId xmlns:a16="http://schemas.microsoft.com/office/drawing/2014/main" id="{7DDEEFC5-85FE-4608-8C67-90F57EB31391}"/>
+              </a:ext>
+            </a:extLst>
+          </p:cNvPr>
+          <p:cNvSpPr/>
+          <p:nvPr/>
+        </p:nvSpPr>
+        <p:spPr>
+          <a:xfrm>
+            <a:off x="1865029" y="1086415"/>
+            <a:ext cx="5413965" cy="4137434"/>
+          </a:xfrm>
+          <a:prstGeom prst="ellipse">
+            <a:avLst/>
+          </a:prstGeom>
+          <a:noFill/>
+          <a:ln w="76200">
+            <a:solidFill>
+              <a:schemeClr val="bg1"/>
+            </a:solidFill>
+          </a:ln>
+        </p:spPr>
+        <p:style>
+          <a:lnRef idx="2">
+            <a:schemeClr val="accent1">
+              <a:shade val="50000"/>
+            </a:schemeClr>
+          </a:lnRef>
+          <a:fillRef idx="1">
+            <a:schemeClr val="accent1"/>
+          </a:fillRef>
+          <a:effectRef idx="0">
+            <a:schemeClr val="accent1"/>
+          </a:effectRef>
+          <a:fontRef idx="minor">
+            <a:schemeClr val="lt1"/>
+          </a:fontRef>
+        </p:style>
+        <p:txBody>
+          <a:bodyPr rtlCol="0" anchor="ctr"/>
+          <a:lstStyle/>
+          <a:p>
+            <a:pPr algn="ctr"/>
+            <a:endParaRPr lang="ca-ES">
+              <a:noFill/>
+            </a:endParaRPr>
+          </a:p>
+        </p:txBody>
+      </p:sp>
+    </p:spTree>
+    <p:extLst>
+      <p:ext uri="{BB962C8B-B14F-4D97-AF65-F5344CB8AC3E}">
+        <p14:creationId xmlns:p14="http://schemas.microsoft.com/office/powerpoint/2010/main" val="1836781412"/>
+      </p:ext>
+    </p:extLst>
+  </p:cSld>
+  <p:clrMapOvr>
+    <a:masterClrMapping/>
+  </p:clrMapOvr>
+</p:sld>
+</file>
+
+<file path=ppt/slides/slide2.xml><?xml version="1.0" encoding="utf-8"?>
 <p:sld xmlns:a="http://schemas.openxmlformats.org/drawingml/2006/main" xmlns:r="http://schemas.openxmlformats.org/officeDocument/2006/relationships" xmlns:p="http://schemas.openxmlformats.org/presentationml/2006/main">
   <p:cSld>
     <p:spTree>
@@ -1108,7 +1247,7 @@
     </p:spTree>
     <p:extLst>
       <p:ext uri="{BB962C8B-B14F-4D97-AF65-F5344CB8AC3E}">
-        <p14:creationId xmlns:p14="http://schemas.microsoft.com/office/powerpoint/2010/main" val="1836781412"/>
+        <p14:creationId xmlns:p14="http://schemas.microsoft.com/office/powerpoint/2010/main" val="2451244541"/>
       </p:ext>
     </p:extLst>
   </p:cSld>
@@ -1118,7 +1257,7 @@
 </p:sld>
 </file>
 
-<file path=ppt/slides/slide2.xml><?xml version="1.0" encoding="utf-8"?>
+<file path=ppt/slides/slide3.xml><?xml version="1.0" encoding="utf-8"?>
 <p:sld xmlns:a="http://schemas.openxmlformats.org/drawingml/2006/main" xmlns:r="http://schemas.openxmlformats.org/officeDocument/2006/relationships" xmlns:p="http://schemas.openxmlformats.org/presentationml/2006/main">
   <p:cSld>
     <p:spTree>
@@ -1255,7 +1394,7 @@
 </p:sld>
 </file>
 
-<file path=ppt/slides/slide3.xml><?xml version="1.0" encoding="utf-8"?>
+<file path=ppt/slides/slide4.xml><?xml version="1.0" encoding="utf-8"?>
 <p:sld xmlns:a="http://schemas.openxmlformats.org/drawingml/2006/main" xmlns:r="http://schemas.openxmlformats.org/officeDocument/2006/relationships" xmlns:p="http://schemas.openxmlformats.org/presentationml/2006/main">
   <p:cSld>
     <p:spTree>

</xml_diff>